<commit_message>
TS20180912 after course update
</commit_message>
<xml_diff>
--- a/tutorial_material/TS20180912/TS20180912.pptx
+++ b/tutorial_material/TS20180912/TS20180912.pptx
@@ -4020,6 +4020,45 @@
           <a:p>
             <a:endParaRPr lang="en-US" dirty="0"/>
           </a:p>
+          <a:p>
+            <a:r>
+              <a:rPr lang="en-US" dirty="0"/>
+              <a:t>If Octave cannot be installed, you could</a:t>
+            </a:r>
+          </a:p>
+          <a:p>
+            <a:pPr lvl="1"/>
+            <a:r>
+              <a:rPr lang="en-US" dirty="0"/>
+              <a:t>Use octave online: </a:t>
+            </a:r>
+            <a:r>
+              <a:rPr lang="en-US" dirty="0">
+                <a:hlinkClick r:id="rId4"/>
+              </a:rPr>
+              <a:t>https://octave-online.net</a:t>
+            </a:r>
+            <a:endParaRPr lang="en-US" dirty="0"/>
+          </a:p>
+          <a:p>
+            <a:pPr lvl="1"/>
+            <a:r>
+              <a:rPr lang="en-US" dirty="0"/>
+              <a:t>Read </a:t>
+            </a:r>
+            <a:r>
+              <a:rPr lang="en-US" i="1" dirty="0"/>
+              <a:t>PHYS4150-2018/</a:t>
+            </a:r>
+            <a:r>
+              <a:rPr lang="en-US" i="1" dirty="0" err="1"/>
+              <a:t>tutorial_material</a:t>
+            </a:r>
+            <a:r>
+              <a:rPr lang="en-US" i="1" dirty="0"/>
+              <a:t>/TS20180912/TS20180912.pdf</a:t>
+            </a:r>
+          </a:p>
         </p:txBody>
       </p:sp>
     </p:spTree>
@@ -4874,7 +4913,7 @@
             </a:r>
             <a:r>
               <a:rPr lang="en-US" dirty="0"/>
-              <a:t> for this course requirements</a:t>
+              <a:t> for the course requirements</a:t>
             </a:r>
           </a:p>
           <a:p>

</xml_diff>